<commit_message>
ADd updated presentation and pdf slides
</commit_message>
<xml_diff>
--- a/A Combined Approach to Detect a Flaky Tests in Python Presentation.pptx
+++ b/A Combined Approach to Detect a Flaky Tests in Python Presentation.pptx
@@ -9,7 +9,7 @@
   </p:notesMasterIdLst>
   <p:sldIdLst>
     <p:sldId id="257" r:id="rId2"/>
-    <p:sldId id="264" r:id="rId3"/>
+    <p:sldId id="436" r:id="rId3"/>
     <p:sldId id="258" r:id="rId4"/>
     <p:sldId id="259" r:id="rId5"/>
     <p:sldId id="260" r:id="rId6"/>
@@ -1166,6 +1166,288 @@
             </a:effectLst>
           </c:spPr>
           <c:invertIfNegative val="0"/>
+          <c:dLbls>
+            <c:dLbl>
+              <c:idx val="0"/>
+              <c:layout>
+                <c:manualLayout>
+                  <c:x val="0"/>
+                  <c:y val="7.4780703045667613E-2"/>
+                </c:manualLayout>
+              </c:layout>
+              <c:spPr>
+                <a:noFill/>
+                <a:ln>
+                  <a:noFill/>
+                </a:ln>
+                <a:effectLst/>
+              </c:spPr>
+              <c:txPr>
+                <a:bodyPr rot="0" spcFirstLastPara="1" vertOverflow="ellipsis" vert="horz" wrap="square" lIns="38100" tIns="19050" rIns="38100" bIns="19050" anchor="ctr" anchorCtr="1">
+                  <a:spAutoFit/>
+                </a:bodyPr>
+                <a:lstStyle/>
+                <a:p>
+                  <a:pPr>
+                    <a:defRPr sz="2000" b="0" i="0" u="none" strike="noStrike" kern="1200" baseline="0">
+                      <a:solidFill>
+                        <a:schemeClr val="tx1"/>
+                      </a:solidFill>
+                      <a:latin typeface="+mn-lt"/>
+                      <a:ea typeface="+mn-ea"/>
+                      <a:cs typeface="+mn-cs"/>
+                    </a:defRPr>
+                  </a:pPr>
+                  <a:endParaRPr lang="en-US"/>
+                </a:p>
+              </c:txPr>
+              <c:showLegendKey val="0"/>
+              <c:showVal val="1"/>
+              <c:showCatName val="0"/>
+              <c:showSerName val="0"/>
+              <c:showPercent val="0"/>
+              <c:showBubbleSize val="0"/>
+              <c:extLst>
+                <c:ext xmlns:c15="http://schemas.microsoft.com/office/drawing/2012/chart" uri="{CE6537A1-D6FC-4f65-9D91-7224C49458BB}"/>
+                <c:ext xmlns:c16="http://schemas.microsoft.com/office/drawing/2014/chart" uri="{C3380CC4-5D6E-409C-BE32-E72D297353CC}">
+                  <c16:uniqueId val="{00000000-615E-491D-A210-A2D6E01C76FA}"/>
+                </c:ext>
+              </c:extLst>
+            </c:dLbl>
+            <c:dLbl>
+              <c:idx val="1"/>
+              <c:layout>
+                <c:manualLayout>
+                  <c:x val="1.0496773440616751E-3"/>
+                  <c:y val="0.11217105456850139"/>
+                </c:manualLayout>
+              </c:layout>
+              <c:tx>
+                <c:rich>
+                  <a:bodyPr rot="0" spcFirstLastPara="1" vertOverflow="ellipsis" vert="horz" wrap="square" lIns="38100" tIns="19050" rIns="38100" bIns="19050" anchor="ctr" anchorCtr="1">
+                    <a:spAutoFit/>
+                  </a:bodyPr>
+                  <a:lstStyle/>
+                  <a:p>
+                    <a:pPr>
+                      <a:defRPr sz="2000" b="0" i="0" u="none" strike="noStrike" kern="1200" baseline="0">
+                        <a:solidFill>
+                          <a:schemeClr val="tx1"/>
+                        </a:solidFill>
+                        <a:latin typeface="+mn-lt"/>
+                        <a:ea typeface="+mn-ea"/>
+                        <a:cs typeface="+mn-cs"/>
+                      </a:defRPr>
+                    </a:pPr>
+                    <a:fld id="{7225B276-8B44-44F9-9AD2-850891FE7982}" type="VALUE">
+                      <a:rPr lang="en-US" sz="2000" smtClean="0">
+                        <a:solidFill>
+                          <a:schemeClr val="tx1"/>
+                        </a:solidFill>
+                      </a:rPr>
+                      <a:pPr>
+                        <a:defRPr sz="2000">
+                          <a:solidFill>
+                            <a:schemeClr val="tx1"/>
+                          </a:solidFill>
+                        </a:defRPr>
+                      </a:pPr>
+                      <a:t>[VALUE]</a:t>
+                    </a:fld>
+                    <a:r>
+                      <a:rPr lang="en-US" sz="2000">
+                        <a:solidFill>
+                          <a:schemeClr val="tx1"/>
+                        </a:solidFill>
+                      </a:rPr>
+                      <a:t>.0</a:t>
+                    </a:r>
+                  </a:p>
+                </c:rich>
+              </c:tx>
+              <c:spPr>
+                <a:noFill/>
+                <a:ln>
+                  <a:noFill/>
+                </a:ln>
+                <a:effectLst/>
+              </c:spPr>
+              <c:txPr>
+                <a:bodyPr rot="0" spcFirstLastPara="1" vertOverflow="ellipsis" vert="horz" wrap="square" lIns="38100" tIns="19050" rIns="38100" bIns="19050" anchor="ctr" anchorCtr="1">
+                  <a:spAutoFit/>
+                </a:bodyPr>
+                <a:lstStyle/>
+                <a:p>
+                  <a:pPr>
+                    <a:defRPr sz="2000" b="0" i="0" u="none" strike="noStrike" kern="1200" baseline="0">
+                      <a:solidFill>
+                        <a:schemeClr val="tx1"/>
+                      </a:solidFill>
+                      <a:latin typeface="+mn-lt"/>
+                      <a:ea typeface="+mn-ea"/>
+                      <a:cs typeface="+mn-cs"/>
+                    </a:defRPr>
+                  </a:pPr>
+                  <a:endParaRPr lang="en-US"/>
+                </a:p>
+              </c:txPr>
+              <c:showLegendKey val="0"/>
+              <c:showVal val="1"/>
+              <c:showCatName val="0"/>
+              <c:showSerName val="0"/>
+              <c:showPercent val="0"/>
+              <c:showBubbleSize val="0"/>
+              <c:extLst>
+                <c:ext xmlns:c15="http://schemas.microsoft.com/office/drawing/2012/chart" uri="{CE6537A1-D6FC-4f65-9D91-7224C49458BB}">
+                  <c15:dlblFieldTable/>
+                  <c15:showDataLabelsRange val="0"/>
+                </c:ext>
+                <c:ext xmlns:c16="http://schemas.microsoft.com/office/drawing/2014/chart" uri="{C3380CC4-5D6E-409C-BE32-E72D297353CC}">
+                  <c16:uniqueId val="{00000003-615E-491D-A210-A2D6E01C76FA}"/>
+                </c:ext>
+              </c:extLst>
+            </c:dLbl>
+            <c:dLbl>
+              <c:idx val="2"/>
+              <c:layout>
+                <c:manualLayout>
+                  <c:x val="0"/>
+                  <c:y val="9.8574563105652768E-2"/>
+                </c:manualLayout>
+              </c:layout>
+              <c:tx>
+                <c:rich>
+                  <a:bodyPr rot="0" spcFirstLastPara="1" vertOverflow="ellipsis" vert="horz" wrap="square" lIns="38100" tIns="19050" rIns="38100" bIns="19050" anchor="ctr" anchorCtr="1">
+                    <a:spAutoFit/>
+                  </a:bodyPr>
+                  <a:lstStyle/>
+                  <a:p>
+                    <a:pPr>
+                      <a:defRPr sz="2000" b="0" i="0" u="none" strike="noStrike" kern="1200" baseline="0">
+                        <a:solidFill>
+                          <a:schemeClr val="tx1"/>
+                        </a:solidFill>
+                        <a:latin typeface="+mn-lt"/>
+                        <a:ea typeface="+mn-ea"/>
+                        <a:cs typeface="+mn-cs"/>
+                      </a:defRPr>
+                    </a:pPr>
+                    <a:fld id="{D9091D9D-040E-444D-931E-0C99626A0907}" type="VALUE">
+                      <a:rPr lang="en-US" sz="2000" smtClean="0"/>
+                      <a:pPr>
+                        <a:defRPr sz="2000">
+                          <a:solidFill>
+                            <a:schemeClr val="tx1"/>
+                          </a:solidFill>
+                        </a:defRPr>
+                      </a:pPr>
+                      <a:t>[VALUE]</a:t>
+                    </a:fld>
+                    <a:r>
+                      <a:rPr lang="en-US" sz="2000" dirty="0"/>
+                      <a:t>.0</a:t>
+                    </a:r>
+                  </a:p>
+                </c:rich>
+              </c:tx>
+              <c:spPr>
+                <a:noFill/>
+                <a:ln>
+                  <a:noFill/>
+                </a:ln>
+                <a:effectLst/>
+              </c:spPr>
+              <c:txPr>
+                <a:bodyPr rot="0" spcFirstLastPara="1" vertOverflow="ellipsis" vert="horz" wrap="square" lIns="38100" tIns="19050" rIns="38100" bIns="19050" anchor="ctr" anchorCtr="1">
+                  <a:spAutoFit/>
+                </a:bodyPr>
+                <a:lstStyle/>
+                <a:p>
+                  <a:pPr>
+                    <a:defRPr sz="2000" b="0" i="0" u="none" strike="noStrike" kern="1200" baseline="0">
+                      <a:solidFill>
+                        <a:schemeClr val="tx1"/>
+                      </a:solidFill>
+                      <a:latin typeface="+mn-lt"/>
+                      <a:ea typeface="+mn-ea"/>
+                      <a:cs typeface="+mn-cs"/>
+                    </a:defRPr>
+                  </a:pPr>
+                  <a:endParaRPr lang="en-US"/>
+                </a:p>
+              </c:txPr>
+              <c:showLegendKey val="0"/>
+              <c:showVal val="1"/>
+              <c:showCatName val="0"/>
+              <c:showSerName val="0"/>
+              <c:showPercent val="0"/>
+              <c:showBubbleSize val="0"/>
+              <c:extLst>
+                <c:ext xmlns:c15="http://schemas.microsoft.com/office/drawing/2012/chart" uri="{CE6537A1-D6FC-4f65-9D91-7224C49458BB}">
+                  <c15:dlblFieldTable/>
+                  <c15:showDataLabelsRange val="0"/>
+                </c:ext>
+                <c:ext xmlns:c16="http://schemas.microsoft.com/office/drawing/2014/chart" uri="{C3380CC4-5D6E-409C-BE32-E72D297353CC}">
+                  <c16:uniqueId val="{00000004-615E-491D-A210-A2D6E01C76FA}"/>
+                </c:ext>
+              </c:extLst>
+            </c:dLbl>
+            <c:spPr>
+              <a:noFill/>
+              <a:ln>
+                <a:noFill/>
+              </a:ln>
+              <a:effectLst/>
+            </c:spPr>
+            <c:txPr>
+              <a:bodyPr rot="0" spcFirstLastPara="1" vertOverflow="ellipsis" vert="horz" wrap="square" lIns="38100" tIns="19050" rIns="38100" bIns="19050" anchor="ctr" anchorCtr="1">
+                <a:spAutoFit/>
+              </a:bodyPr>
+              <a:lstStyle/>
+              <a:p>
+                <a:pPr>
+                  <a:defRPr sz="2000" b="0" i="0" u="none" strike="noStrike" kern="1200" baseline="0">
+                    <a:solidFill>
+                      <a:schemeClr val="tx1">
+                        <a:lumMod val="75000"/>
+                        <a:lumOff val="25000"/>
+                      </a:schemeClr>
+                    </a:solidFill>
+                    <a:latin typeface="+mn-lt"/>
+                    <a:ea typeface="+mn-ea"/>
+                    <a:cs typeface="+mn-cs"/>
+                  </a:defRPr>
+                </a:pPr>
+                <a:endParaRPr lang="en-US"/>
+              </a:p>
+            </c:txPr>
+            <c:showLegendKey val="0"/>
+            <c:showVal val="1"/>
+            <c:showCatName val="0"/>
+            <c:showSerName val="0"/>
+            <c:showPercent val="0"/>
+            <c:showBubbleSize val="0"/>
+            <c:showLeaderLines val="0"/>
+            <c:extLst>
+              <c:ext xmlns:c15="http://schemas.microsoft.com/office/drawing/2012/chart" uri="{CE6537A1-D6FC-4f65-9D91-7224C49458BB}">
+                <c15:showLeaderLines val="1"/>
+                <c15:leaderLines>
+                  <c:spPr>
+                    <a:ln w="9525" cap="flat" cmpd="sng" algn="ctr">
+                      <a:solidFill>
+                        <a:schemeClr val="tx1">
+                          <a:lumMod val="35000"/>
+                          <a:lumOff val="65000"/>
+                        </a:schemeClr>
+                      </a:solidFill>
+                      <a:round/>
+                    </a:ln>
+                    <a:effectLst/>
+                  </c:spPr>
+                </c15:leaderLines>
+              </c:ext>
+            </c:extLst>
+          </c:dLbls>
           <c:cat>
             <c:strRef>
               <c:f>Sheet1!$A$2:$A$4</c:f>
@@ -1242,6 +1524,123 @@
             </a:effectLst>
           </c:spPr>
           <c:invertIfNegative val="0"/>
+          <c:dLbls>
+            <c:dLbl>
+              <c:idx val="0"/>
+              <c:layout>
+                <c:manualLayout>
+                  <c:x val="0"/>
+                  <c:y val="7.1381580179955453E-2"/>
+                </c:manualLayout>
+              </c:layout>
+              <c:showLegendKey val="0"/>
+              <c:showVal val="1"/>
+              <c:showCatName val="0"/>
+              <c:showSerName val="0"/>
+              <c:showPercent val="0"/>
+              <c:showBubbleSize val="0"/>
+              <c:extLst>
+                <c:ext xmlns:c15="http://schemas.microsoft.com/office/drawing/2012/chart" uri="{CE6537A1-D6FC-4f65-9D91-7224C49458BB}"/>
+                <c:ext xmlns:c16="http://schemas.microsoft.com/office/drawing/2014/chart" uri="{C3380CC4-5D6E-409C-BE32-E72D297353CC}">
+                  <c16:uniqueId val="{00000001-615E-491D-A210-A2D6E01C76FA}"/>
+                </c:ext>
+              </c:extLst>
+            </c:dLbl>
+            <c:dLbl>
+              <c:idx val="1"/>
+              <c:layout>
+                <c:manualLayout>
+                  <c:x val="0"/>
+                  <c:y val="0.11557017743421359"/>
+                </c:manualLayout>
+              </c:layout>
+              <c:showLegendKey val="0"/>
+              <c:showVal val="1"/>
+              <c:showCatName val="0"/>
+              <c:showSerName val="0"/>
+              <c:showPercent val="0"/>
+              <c:showBubbleSize val="0"/>
+              <c:extLst>
+                <c:ext xmlns:c15="http://schemas.microsoft.com/office/drawing/2012/chart" uri="{CE6537A1-D6FC-4f65-9D91-7224C49458BB}"/>
+                <c:ext xmlns:c16="http://schemas.microsoft.com/office/drawing/2014/chart" uri="{C3380CC4-5D6E-409C-BE32-E72D297353CC}">
+                  <c16:uniqueId val="{00000002-615E-491D-A210-A2D6E01C76FA}"/>
+                </c:ext>
+              </c:extLst>
+            </c:dLbl>
+            <c:dLbl>
+              <c:idx val="2"/>
+              <c:layout>
+                <c:manualLayout>
+                  <c:x val="1.0496773440617521E-3"/>
+                  <c:y val="0.10197368597136493"/>
+                </c:manualLayout>
+              </c:layout>
+              <c:showLegendKey val="0"/>
+              <c:showVal val="1"/>
+              <c:showCatName val="0"/>
+              <c:showSerName val="0"/>
+              <c:showPercent val="0"/>
+              <c:showBubbleSize val="0"/>
+              <c:extLst>
+                <c:ext xmlns:c15="http://schemas.microsoft.com/office/drawing/2012/chart" uri="{CE6537A1-D6FC-4f65-9D91-7224C49458BB}"/>
+                <c:ext xmlns:c16="http://schemas.microsoft.com/office/drawing/2014/chart" uri="{C3380CC4-5D6E-409C-BE32-E72D297353CC}">
+                  <c16:uniqueId val="{00000005-615E-491D-A210-A2D6E01C76FA}"/>
+                </c:ext>
+              </c:extLst>
+            </c:dLbl>
+            <c:spPr>
+              <a:noFill/>
+              <a:ln>
+                <a:noFill/>
+              </a:ln>
+              <a:effectLst/>
+            </c:spPr>
+            <c:txPr>
+              <a:bodyPr rot="0" spcFirstLastPara="1" vertOverflow="ellipsis" vert="horz" wrap="square" lIns="38100" tIns="19050" rIns="38100" bIns="19050" anchor="ctr" anchorCtr="1">
+                <a:spAutoFit/>
+              </a:bodyPr>
+              <a:lstStyle/>
+              <a:p>
+                <a:pPr>
+                  <a:defRPr sz="2000" b="0" i="0" u="none" strike="noStrike" kern="1200" baseline="0">
+                    <a:solidFill>
+                      <a:schemeClr val="tx1"/>
+                    </a:solidFill>
+                    <a:latin typeface="+mn-lt"/>
+                    <a:ea typeface="+mn-ea"/>
+                    <a:cs typeface="+mn-cs"/>
+                  </a:defRPr>
+                </a:pPr>
+                <a:endParaRPr lang="en-US"/>
+              </a:p>
+            </c:txPr>
+            <c:showLegendKey val="0"/>
+            <c:showVal val="1"/>
+            <c:showCatName val="0"/>
+            <c:showSerName val="0"/>
+            <c:showPercent val="0"/>
+            <c:showBubbleSize val="0"/>
+            <c:showLeaderLines val="0"/>
+            <c:extLst>
+              <c:ext xmlns:c15="http://schemas.microsoft.com/office/drawing/2012/chart" uri="{CE6537A1-D6FC-4f65-9D91-7224C49458BB}">
+                <c15:showLeaderLines val="1"/>
+                <c15:leaderLines>
+                  <c:spPr>
+                    <a:ln w="9525" cap="flat" cmpd="sng" algn="ctr">
+                      <a:solidFill>
+                        <a:schemeClr val="tx1">
+                          <a:lumMod val="35000"/>
+                          <a:lumOff val="65000"/>
+                        </a:schemeClr>
+                      </a:solidFill>
+                      <a:round/>
+                    </a:ln>
+                    <a:effectLst/>
+                  </c:spPr>
+                </c15:leaderLines>
+              </c:ext>
+            </c:extLst>
+          </c:dLbls>
           <c:cat>
             <c:strRef>
               <c:f>Sheet1!$A$2:$A$4</c:f>
@@ -1319,7 +1718,7 @@
         <c:scaling>
           <c:orientation val="minMax"/>
           <c:max val="100"/>
-          <c:min val="0"/>
+          <c:min val="1"/>
         </c:scaling>
         <c:delete val="0"/>
         <c:axPos val="l"/>
@@ -9717,7 +10116,7 @@
           <a:p>
             <a:fld id="{B813853A-6CAB-4D5E-AEBC-86EB23AC768A}" type="datetimeFigureOut">
               <a:rPr lang="en-US" smtClean="0"/>
-              <a:t>11/29/2021</a:t>
+              <a:t>11/30/2021</a:t>
             </a:fld>
             <a:endParaRPr lang="en-US"/>
           </a:p>
@@ -10086,6 +10485,180 @@
 </file>
 
 <file path=ppt/notesSlides/notesSlide2.xml><?xml version="1.0" encoding="utf-8"?>
+<p:notes xmlns:a="http://schemas.openxmlformats.org/drawingml/2006/main" xmlns:r="http://schemas.openxmlformats.org/officeDocument/2006/relationships" xmlns:p="http://schemas.openxmlformats.org/presentationml/2006/main">
+  <p:cSld>
+    <p:spTree>
+      <p:nvGrpSpPr>
+        <p:cNvPr id="1" name=""/>
+        <p:cNvGrpSpPr/>
+        <p:nvPr/>
+      </p:nvGrpSpPr>
+      <p:grpSpPr>
+        <a:xfrm>
+          <a:off x="0" y="0"/>
+          <a:ext cx="0" cy="0"/>
+          <a:chOff x="0" y="0"/>
+          <a:chExt cx="0" cy="0"/>
+        </a:xfrm>
+      </p:grpSpPr>
+      <p:sp>
+        <p:nvSpPr>
+          <p:cNvPr id="2" name="Slide Image Placeholder 1"/>
+          <p:cNvSpPr>
+            <a:spLocks noGrp="1" noRot="1" noChangeAspect="1"/>
+          </p:cNvSpPr>
+          <p:nvPr>
+            <p:ph type="sldImg"/>
+          </p:nvPr>
+        </p:nvSpPr>
+        <p:spPr/>
+      </p:sp>
+      <p:sp>
+        <p:nvSpPr>
+          <p:cNvPr id="3" name="Notes Placeholder 2"/>
+          <p:cNvSpPr>
+            <a:spLocks noGrp="1"/>
+          </p:cNvSpPr>
+          <p:nvPr>
+            <p:ph type="body" idx="1"/>
+          </p:nvPr>
+        </p:nvSpPr>
+        <p:spPr/>
+        <p:txBody>
+          <a:bodyPr/>
+          <a:lstStyle/>
+          <a:p>
+            <a:r>
+              <a:rPr lang="en-US" dirty="0"/>
+              <a:t>- Explain test smells</a:t>
+            </a:r>
+          </a:p>
+        </p:txBody>
+      </p:sp>
+      <p:sp>
+        <p:nvSpPr>
+          <p:cNvPr id="4" name="Slide Number Placeholder 3"/>
+          <p:cNvSpPr>
+            <a:spLocks noGrp="1"/>
+          </p:cNvSpPr>
+          <p:nvPr>
+            <p:ph type="sldNum" sz="quarter" idx="5"/>
+          </p:nvPr>
+        </p:nvSpPr>
+        <p:spPr/>
+        <p:txBody>
+          <a:bodyPr/>
+          <a:lstStyle/>
+          <a:p>
+            <a:fld id="{0079FFF6-C3A0-4768-9521-333207FBE7C1}" type="slidenum">
+              <a:rPr lang="en-US" smtClean="0"/>
+              <a:t>5</a:t>
+            </a:fld>
+            <a:endParaRPr lang="en-US"/>
+          </a:p>
+        </p:txBody>
+      </p:sp>
+    </p:spTree>
+    <p:extLst>
+      <p:ext uri="{BB962C8B-B14F-4D97-AF65-F5344CB8AC3E}">
+        <p14:creationId xmlns:p14="http://schemas.microsoft.com/office/powerpoint/2010/main" val="587751573"/>
+      </p:ext>
+    </p:extLst>
+  </p:cSld>
+  <p:clrMapOvr>
+    <a:masterClrMapping/>
+  </p:clrMapOvr>
+</p:notes>
+</file>
+
+<file path=ppt/notesSlides/notesSlide3.xml><?xml version="1.0" encoding="utf-8"?>
+<p:notes xmlns:a="http://schemas.openxmlformats.org/drawingml/2006/main" xmlns:r="http://schemas.openxmlformats.org/officeDocument/2006/relationships" xmlns:p="http://schemas.openxmlformats.org/presentationml/2006/main">
+  <p:cSld>
+    <p:spTree>
+      <p:nvGrpSpPr>
+        <p:cNvPr id="1" name=""/>
+        <p:cNvGrpSpPr/>
+        <p:nvPr/>
+      </p:nvGrpSpPr>
+      <p:grpSpPr>
+        <a:xfrm>
+          <a:off x="0" y="0"/>
+          <a:ext cx="0" cy="0"/>
+          <a:chOff x="0" y="0"/>
+          <a:chExt cx="0" cy="0"/>
+        </a:xfrm>
+      </p:grpSpPr>
+      <p:sp>
+        <p:nvSpPr>
+          <p:cNvPr id="2" name="Slide Image Placeholder 1"/>
+          <p:cNvSpPr>
+            <a:spLocks noGrp="1" noRot="1" noChangeAspect="1"/>
+          </p:cNvSpPr>
+          <p:nvPr>
+            <p:ph type="sldImg"/>
+          </p:nvPr>
+        </p:nvSpPr>
+        <p:spPr/>
+      </p:sp>
+      <p:sp>
+        <p:nvSpPr>
+          <p:cNvPr id="3" name="Notes Placeholder 2"/>
+          <p:cNvSpPr>
+            <a:spLocks noGrp="1"/>
+          </p:cNvSpPr>
+          <p:nvPr>
+            <p:ph type="body" idx="1"/>
+          </p:nvPr>
+        </p:nvSpPr>
+        <p:spPr/>
+        <p:txBody>
+          <a:bodyPr/>
+          <a:lstStyle/>
+          <a:p>
+            <a:r>
+              <a:rPr lang="en-US" dirty="0"/>
+              <a:t>- Random forest which takes as input both the vocabulary of the tests and the test smells as well</a:t>
+            </a:r>
+          </a:p>
+        </p:txBody>
+      </p:sp>
+      <p:sp>
+        <p:nvSpPr>
+          <p:cNvPr id="4" name="Slide Number Placeholder 3"/>
+          <p:cNvSpPr>
+            <a:spLocks noGrp="1"/>
+          </p:cNvSpPr>
+          <p:nvPr>
+            <p:ph type="sldNum" sz="quarter" idx="5"/>
+          </p:nvPr>
+        </p:nvSpPr>
+        <p:spPr/>
+        <p:txBody>
+          <a:bodyPr/>
+          <a:lstStyle/>
+          <a:p>
+            <a:fld id="{0079FFF6-C3A0-4768-9521-333207FBE7C1}" type="slidenum">
+              <a:rPr lang="en-US" smtClean="0"/>
+              <a:t>7</a:t>
+            </a:fld>
+            <a:endParaRPr lang="en-US"/>
+          </a:p>
+        </p:txBody>
+      </p:sp>
+    </p:spTree>
+    <p:extLst>
+      <p:ext uri="{BB962C8B-B14F-4D97-AF65-F5344CB8AC3E}">
+        <p14:creationId xmlns:p14="http://schemas.microsoft.com/office/powerpoint/2010/main" val="2718880432"/>
+      </p:ext>
+    </p:extLst>
+  </p:cSld>
+  <p:clrMapOvr>
+    <a:masterClrMapping/>
+  </p:clrMapOvr>
+</p:notes>
+</file>
+
+<file path=ppt/notesSlides/notesSlide4.xml><?xml version="1.0" encoding="utf-8"?>
 <p:notes xmlns:a="http://schemas.openxmlformats.org/drawingml/2006/main" xmlns:r="http://schemas.openxmlformats.org/officeDocument/2006/relationships" xmlns:p="http://schemas.openxmlformats.org/presentationml/2006/main">
   <p:cSld>
     <p:spTree>
@@ -10669,7 +11242,7 @@
           <a:p>
             <a:fld id="{02AC24A9-CCB6-4F8D-B8DB-C2F3692CFA5A}" type="datetimeFigureOut">
               <a:rPr lang="en-US" smtClean="0"/>
-              <a:t>11/29/2021</a:t>
+              <a:t>11/30/2021</a:t>
             </a:fld>
             <a:endParaRPr lang="en-US" dirty="0"/>
           </a:p>
@@ -11039,7 +11612,7 @@
           <a:p>
             <a:fld id="{02AC24A9-CCB6-4F8D-B8DB-C2F3692CFA5A}" type="datetimeFigureOut">
               <a:rPr lang="en-US" smtClean="0"/>
-              <a:t>11/29/2021</a:t>
+              <a:t>11/30/2021</a:t>
             </a:fld>
             <a:endParaRPr lang="en-US"/>
           </a:p>
@@ -11248,7 +11821,7 @@
           <a:p>
             <a:fld id="{02AC24A9-CCB6-4F8D-B8DB-C2F3692CFA5A}" type="datetimeFigureOut">
               <a:rPr lang="en-US" smtClean="0"/>
-              <a:t>11/29/2021</a:t>
+              <a:t>11/30/2021</a:t>
             </a:fld>
             <a:endParaRPr lang="en-US"/>
           </a:p>
@@ -11718,7 +12291,7 @@
           <a:p>
             <a:fld id="{02AC24A9-CCB6-4F8D-B8DB-C2F3692CFA5A}" type="datetimeFigureOut">
               <a:rPr lang="en-US" smtClean="0"/>
-              <a:t>11/29/2021</a:t>
+              <a:t>11/30/2021</a:t>
             </a:fld>
             <a:endParaRPr lang="en-US"/>
           </a:p>
@@ -12172,7 +12745,7 @@
           <a:p>
             <a:fld id="{02AC24A9-CCB6-4F8D-B8DB-C2F3692CFA5A}" type="datetimeFigureOut">
               <a:rPr lang="en-US" smtClean="0"/>
-              <a:t>11/29/2021</a:t>
+              <a:t>11/30/2021</a:t>
             </a:fld>
             <a:endParaRPr lang="en-US"/>
           </a:p>
@@ -12704,7 +13277,7 @@
           <a:p>
             <a:fld id="{02AC24A9-CCB6-4F8D-B8DB-C2F3692CFA5A}" type="datetimeFigureOut">
               <a:rPr lang="en-US" smtClean="0"/>
-              <a:t>11/29/2021</a:t>
+              <a:t>11/30/2021</a:t>
             </a:fld>
             <a:endParaRPr lang="en-US"/>
           </a:p>
@@ -13403,7 +13976,7 @@
           <a:p>
             <a:fld id="{02AC24A9-CCB6-4F8D-B8DB-C2F3692CFA5A}" type="datetimeFigureOut">
               <a:rPr lang="en-US" smtClean="0"/>
-              <a:t>11/29/2021</a:t>
+              <a:t>11/30/2021</a:t>
             </a:fld>
             <a:endParaRPr lang="en-US"/>
           </a:p>
@@ -13732,7 +14305,7 @@
           <a:p>
             <a:fld id="{02AC24A9-CCB6-4F8D-B8DB-C2F3692CFA5A}" type="datetimeFigureOut">
               <a:rPr lang="en-US" smtClean="0"/>
-              <a:t>11/29/2021</a:t>
+              <a:t>11/30/2021</a:t>
             </a:fld>
             <a:endParaRPr lang="en-US"/>
           </a:p>
@@ -13845,7 +14418,7 @@
           <a:p>
             <a:fld id="{02AC24A9-CCB6-4F8D-B8DB-C2F3692CFA5A}" type="datetimeFigureOut">
               <a:rPr lang="en-US" smtClean="0"/>
-              <a:t>11/29/2021</a:t>
+              <a:t>11/30/2021</a:t>
             </a:fld>
             <a:endParaRPr lang="en-US"/>
           </a:p>
@@ -14340,7 +14913,7 @@
           <a:p>
             <a:fld id="{02AC24A9-CCB6-4F8D-B8DB-C2F3692CFA5A}" type="datetimeFigureOut">
               <a:rPr lang="en-US" smtClean="0"/>
-              <a:t>11/29/2021</a:t>
+              <a:t>11/30/2021</a:t>
             </a:fld>
             <a:endParaRPr lang="en-US" dirty="0"/>
           </a:p>
@@ -14817,7 +15390,7 @@
           <a:p>
             <a:fld id="{02AC24A9-CCB6-4F8D-B8DB-C2F3692CFA5A}" type="datetimeFigureOut">
               <a:rPr lang="en-US" smtClean="0"/>
-              <a:t>11/29/2021</a:t>
+              <a:t>11/30/2021</a:t>
             </a:fld>
             <a:endParaRPr lang="en-US"/>
           </a:p>
@@ -15060,7 +15633,7 @@
           <a:p>
             <a:fld id="{02AC24A9-CCB6-4F8D-B8DB-C2F3692CFA5A}" type="datetimeFigureOut">
               <a:rPr lang="en-US" smtClean="0"/>
-              <a:t>11/29/2021</a:t>
+              <a:t>11/30/2021</a:t>
             </a:fld>
             <a:endParaRPr lang="en-US"/>
           </a:p>
@@ -16906,7 +17479,7 @@
                   <a:schemeClr val="tx1"/>
                 </a:solidFill>
               </a:rPr>
-              <a:t>Micro Precision</a:t>
+              <a:t>Macro Precision</a:t>
             </a:r>
             <a:endParaRPr lang="en-US" b="1" dirty="0">
               <a:solidFill>
@@ -17017,7 +17590,7 @@
                   <a:schemeClr val="tx1"/>
                 </a:solidFill>
               </a:rPr>
-              <a:t>Micro F1-Score</a:t>
+              <a:t>Macro F1-Score</a:t>
             </a:r>
           </a:p>
         </p:txBody>
@@ -17123,7 +17696,7 @@
                   <a:schemeClr val="tx1"/>
                 </a:solidFill>
               </a:rPr>
-              <a:t>Micro Recall</a:t>
+              <a:t>Macro Recall</a:t>
             </a:r>
           </a:p>
         </p:txBody>
@@ -17190,13 +17763,13 @@
   <p:clrMapOvr>
     <a:masterClrMapping/>
   </p:clrMapOvr>
-  <mc:AlternateContent xmlns:mc="http://schemas.openxmlformats.org/markup-compatibility/2006">
-    <mc:Choice xmlns:p159="http://schemas.microsoft.com/office/powerpoint/2015/09/main" Requires="p159">
+  <mc:AlternateContent xmlns:mc="http://schemas.openxmlformats.org/markup-compatibility/2006" xmlns:p159="http://schemas.microsoft.com/office/powerpoint/2015/09/main">
+    <mc:Choice Requires="p159">
       <p:transition spd="slow">
         <p159:morph option="byObject"/>
       </p:transition>
     </mc:Choice>
-    <mc:Fallback>
+    <mc:Fallback xmlns="">
       <p:transition spd="slow">
         <p:fade/>
       </p:transition>
@@ -17302,7 +17875,7 @@
                   <a:schemeClr val="tx1"/>
                 </a:solidFill>
               </a:rPr>
-              <a:t>Micro Precision</a:t>
+              <a:t>Macro Precision</a:t>
             </a:r>
             <a:endParaRPr lang="en-US" b="1" dirty="0">
               <a:solidFill>
@@ -17413,7 +17986,7 @@
                   <a:schemeClr val="tx1"/>
                 </a:solidFill>
               </a:rPr>
-              <a:t>Micro F1-Score</a:t>
+              <a:t>Macro F1-Score</a:t>
             </a:r>
           </a:p>
         </p:txBody>
@@ -17519,7 +18092,7 @@
                   <a:schemeClr val="tx1"/>
                 </a:solidFill>
               </a:rPr>
-              <a:t>Micro Recall</a:t>
+              <a:t>Macro Recall</a:t>
             </a:r>
           </a:p>
         </p:txBody>
@@ -17589,13 +18162,13 @@
           <p:nvPr>
             <p:extLst>
               <p:ext uri="{D42A27DB-BD31-4B8C-83A1-F6EECF244321}">
-                <p14:modId xmlns:p14="http://schemas.microsoft.com/office/powerpoint/2010/main" val="979044169"/>
+                <p14:modId xmlns:p14="http://schemas.microsoft.com/office/powerpoint/2010/main" val="2906240921"/>
               </p:ext>
             </p:extLst>
           </p:nvPr>
         </p:nvGraphicFramePr>
         <p:xfrm>
-          <a:off x="0" y="2831690"/>
+          <a:off x="33867" y="2831690"/>
           <a:ext cx="12098956" cy="3736258"/>
         </p:xfrm>
         <a:graphic>
@@ -17614,13 +18187,13 @@
   <p:clrMapOvr>
     <a:masterClrMapping/>
   </p:clrMapOvr>
-  <mc:AlternateContent xmlns:mc="http://schemas.openxmlformats.org/markup-compatibility/2006">
-    <mc:Choice xmlns:p159="http://schemas.microsoft.com/office/powerpoint/2015/09/main" Requires="p159">
+  <mc:AlternateContent xmlns:mc="http://schemas.openxmlformats.org/markup-compatibility/2006" xmlns:p159="http://schemas.microsoft.com/office/powerpoint/2015/09/main">
+    <mc:Choice Requires="p159">
       <p:transition spd="slow">
         <p159:morph option="byObject"/>
       </p:transition>
     </mc:Choice>
-    <mc:Fallback>
+    <mc:Fallback xmlns="">
       <p:transition spd="slow">
         <p:fade/>
       </p:transition>
@@ -18599,13 +19172,13 @@
   <p:clrMapOvr>
     <a:masterClrMapping/>
   </p:clrMapOvr>
-  <mc:AlternateContent xmlns:mc="http://schemas.openxmlformats.org/markup-compatibility/2006">
-    <mc:Choice xmlns:p14="http://schemas.microsoft.com/office/powerpoint/2010/main" Requires="p14">
+  <mc:AlternateContent xmlns:mc="http://schemas.openxmlformats.org/markup-compatibility/2006" xmlns:p14="http://schemas.microsoft.com/office/powerpoint/2010/main">
+    <mc:Choice Requires="p14">
       <p:transition spd="med" p14:dur="700">
         <p:fade/>
       </p:transition>
     </mc:Choice>
-    <mc:Fallback>
+    <mc:Fallback xmlns="">
       <p:transition spd="med">
         <p:fade/>
       </p:transition>
@@ -21592,7 +22165,7 @@
         </p:blipFill>
         <p:spPr>
           <a:xfrm>
-            <a:off x="2767611" y="5722657"/>
+            <a:off x="2331780" y="3981033"/>
             <a:ext cx="8058150" cy="1247775"/>
           </a:xfrm>
           <a:prstGeom prst="rect">
@@ -23483,55 +24056,6 @@
       </p:grpSpPr>
       <p:sp>
         <p:nvSpPr>
-          <p:cNvPr id="4" name="Content Placeholder 3">
-            <a:extLst>
-              <a:ext uri="{FF2B5EF4-FFF2-40B4-BE49-F238E27FC236}">
-                <a16:creationId xmlns:a16="http://schemas.microsoft.com/office/drawing/2014/main" id="{315B6CF2-6E2D-48AA-803D-F3AFAAC7C415}"/>
-              </a:ext>
-            </a:extLst>
-          </p:cNvPr>
-          <p:cNvSpPr>
-            <a:spLocks noGrp="1"/>
-          </p:cNvSpPr>
-          <p:nvPr>
-            <p:ph idx="1"/>
-          </p:nvPr>
-        </p:nvSpPr>
-        <p:spPr/>
-        <p:txBody>
-          <a:bodyPr/>
-          <a:lstStyle/>
-          <a:p>
-            <a:r>
-              <a:rPr lang="en-US" dirty="0"/>
-              <a:t>Python projects</a:t>
-            </a:r>
-          </a:p>
-          <a:p>
-            <a:endParaRPr lang="en-US" dirty="0"/>
-          </a:p>
-          <a:p>
-            <a:r>
-              <a:rPr lang="en-US" dirty="0"/>
-              <a:t>~22,000 Repositories</a:t>
-            </a:r>
-          </a:p>
-          <a:p>
-            <a:endParaRPr lang="en-US" dirty="0"/>
-          </a:p>
-          <a:p>
-            <a:r>
-              <a:rPr lang="en-US" dirty="0"/>
-              <a:t>~800,000 Test Cases</a:t>
-            </a:r>
-          </a:p>
-          <a:p>
-            <a:endParaRPr lang="en-US" dirty="0"/>
-          </a:p>
-        </p:txBody>
-      </p:sp>
-      <p:sp>
-        <p:nvSpPr>
           <p:cNvPr id="8" name="Title 7">
             <a:extLst>
               <a:ext uri="{FF2B5EF4-FFF2-40B4-BE49-F238E27FC236}">
@@ -23555,17 +24079,521 @@
           <a:p>
             <a:r>
               <a:rPr lang="en-US" dirty="0"/>
-              <a:t>Collect Flaky Tests</a:t>
+              <a:t>Introduction</a:t>
+            </a:r>
+          </a:p>
+        </p:txBody>
+      </p:sp>
+      <p:sp>
+        <p:nvSpPr>
+          <p:cNvPr id="15" name="Rectangle 14">
+            <a:extLst>
+              <a:ext uri="{FF2B5EF4-FFF2-40B4-BE49-F238E27FC236}">
+                <a16:creationId xmlns:a16="http://schemas.microsoft.com/office/drawing/2014/main" id="{F735F9FD-BE63-40A0-997B-60F5669CC75A}"/>
+              </a:ext>
+            </a:extLst>
+          </p:cNvPr>
+          <p:cNvSpPr/>
+          <p:nvPr/>
+        </p:nvSpPr>
+        <p:spPr>
+          <a:xfrm>
+            <a:off x="394171" y="2556769"/>
+            <a:ext cx="5599223" cy="4057095"/>
+          </a:xfrm>
+          <a:prstGeom prst="rect">
+            <a:avLst/>
+          </a:prstGeom>
+          <a:noFill/>
+          <a:ln w="76200">
+            <a:solidFill>
+              <a:srgbClr val="E9C44D"/>
+            </a:solidFill>
+          </a:ln>
+        </p:spPr>
+        <p:style>
+          <a:lnRef idx="2">
+            <a:schemeClr val="accent6"/>
+          </a:lnRef>
+          <a:fillRef idx="1">
+            <a:schemeClr val="lt1"/>
+          </a:fillRef>
+          <a:effectRef idx="0">
+            <a:schemeClr val="accent6"/>
+          </a:effectRef>
+          <a:fontRef idx="minor">
+            <a:schemeClr val="dk1"/>
+          </a:fontRef>
+        </p:style>
+        <p:txBody>
+          <a:bodyPr rtlCol="0" anchor="ctr"/>
+          <a:lstStyle/>
+          <a:p>
+            <a:pPr algn="ctr"/>
+            <a:endParaRPr lang="en-US"/>
+          </a:p>
+        </p:txBody>
+      </p:sp>
+      <p:sp>
+        <p:nvSpPr>
+          <p:cNvPr id="16" name="Rectangle 15">
+            <a:extLst>
+              <a:ext uri="{FF2B5EF4-FFF2-40B4-BE49-F238E27FC236}">
+                <a16:creationId xmlns:a16="http://schemas.microsoft.com/office/drawing/2014/main" id="{04F1D2EC-03CF-4582-912F-F8BB9C7B5CC4}"/>
+              </a:ext>
+            </a:extLst>
+          </p:cNvPr>
+          <p:cNvSpPr/>
+          <p:nvPr/>
+        </p:nvSpPr>
+        <p:spPr>
+          <a:xfrm>
+            <a:off x="6096000" y="2556769"/>
+            <a:ext cx="5599223" cy="4057095"/>
+          </a:xfrm>
+          <a:prstGeom prst="rect">
+            <a:avLst/>
+          </a:prstGeom>
+          <a:noFill/>
+          <a:ln w="76200">
+            <a:solidFill>
+              <a:srgbClr val="76AABA"/>
+            </a:solidFill>
+          </a:ln>
+        </p:spPr>
+        <p:style>
+          <a:lnRef idx="2">
+            <a:schemeClr val="accent6"/>
+          </a:lnRef>
+          <a:fillRef idx="1">
+            <a:schemeClr val="lt1"/>
+          </a:fillRef>
+          <a:effectRef idx="0">
+            <a:schemeClr val="accent6"/>
+          </a:effectRef>
+          <a:fontRef idx="minor">
+            <a:schemeClr val="dk1"/>
+          </a:fontRef>
+        </p:style>
+        <p:txBody>
+          <a:bodyPr rtlCol="0" anchor="ctr"/>
+          <a:lstStyle/>
+          <a:p>
+            <a:pPr algn="ctr"/>
+            <a:endParaRPr lang="en-US"/>
+          </a:p>
+        </p:txBody>
+      </p:sp>
+      <p:sp>
+        <p:nvSpPr>
+          <p:cNvPr id="17" name="Text Placeholder 2">
+            <a:extLst>
+              <a:ext uri="{FF2B5EF4-FFF2-40B4-BE49-F238E27FC236}">
+                <a16:creationId xmlns:a16="http://schemas.microsoft.com/office/drawing/2014/main" id="{DC82B79A-D76D-477D-A9C4-CE1CDB32F88C}"/>
+              </a:ext>
+            </a:extLst>
+          </p:cNvPr>
+          <p:cNvSpPr txBox="1">
+            <a:spLocks/>
+          </p:cNvSpPr>
+          <p:nvPr/>
+        </p:nvSpPr>
+        <p:spPr>
+          <a:xfrm>
+            <a:off x="906075" y="2850519"/>
+            <a:ext cx="4575414" cy="823912"/>
+          </a:xfrm>
+          <a:prstGeom prst="rect">
+            <a:avLst/>
+          </a:prstGeom>
+        </p:spPr>
+        <p:txBody>
+          <a:bodyPr vert="horz" lIns="91440" tIns="45720" rIns="91440" bIns="45720" rtlCol="0">
+            <a:normAutofit/>
+          </a:bodyPr>
+          <a:lstStyle>
+            <a:lvl1pPr marL="228600" indent="-228600" algn="l" defTabSz="914400" rtl="0" eaLnBrk="1" latinLnBrk="0" hangingPunct="1">
+              <a:lnSpc>
+                <a:spcPct val="110000"/>
+              </a:lnSpc>
+              <a:spcBef>
+                <a:spcPts val="1000"/>
+              </a:spcBef>
+              <a:buFont typeface="Arial" panose="020B0604020202020204" pitchFamily="34" charset="0"/>
+              <a:buChar char="•"/>
+              <a:defRPr sz="2400" kern="1200">
+                <a:solidFill>
+                  <a:schemeClr val="tx1"/>
+                </a:solidFill>
+                <a:latin typeface="+mn-lt"/>
+                <a:ea typeface="+mn-ea"/>
+                <a:cs typeface="+mn-cs"/>
+              </a:defRPr>
+            </a:lvl1pPr>
+            <a:lvl2pPr marL="685800" indent="-228600" algn="l" defTabSz="914400" rtl="0" eaLnBrk="1" latinLnBrk="0" hangingPunct="1">
+              <a:lnSpc>
+                <a:spcPct val="110000"/>
+              </a:lnSpc>
+              <a:spcBef>
+                <a:spcPts val="500"/>
+              </a:spcBef>
+              <a:buFont typeface="Arial" panose="020B0604020202020204" pitchFamily="34" charset="0"/>
+              <a:buChar char="•"/>
+              <a:defRPr sz="2000" kern="1200">
+                <a:solidFill>
+                  <a:schemeClr val="tx1"/>
+                </a:solidFill>
+                <a:latin typeface="+mn-lt"/>
+                <a:ea typeface="+mn-ea"/>
+                <a:cs typeface="+mn-cs"/>
+              </a:defRPr>
+            </a:lvl2pPr>
+            <a:lvl3pPr marL="1143000" indent="-228600" algn="l" defTabSz="914400" rtl="0" eaLnBrk="1" latinLnBrk="0" hangingPunct="1">
+              <a:lnSpc>
+                <a:spcPct val="110000"/>
+              </a:lnSpc>
+              <a:spcBef>
+                <a:spcPts val="500"/>
+              </a:spcBef>
+              <a:buFont typeface="Arial" panose="020B0604020202020204" pitchFamily="34" charset="0"/>
+              <a:buChar char="•"/>
+              <a:defRPr sz="1800" kern="1200">
+                <a:solidFill>
+                  <a:schemeClr val="tx1"/>
+                </a:solidFill>
+                <a:latin typeface="+mn-lt"/>
+                <a:ea typeface="+mn-ea"/>
+                <a:cs typeface="+mn-cs"/>
+              </a:defRPr>
+            </a:lvl3pPr>
+            <a:lvl4pPr marL="1600200" indent="-228600" algn="l" defTabSz="914400" rtl="0" eaLnBrk="1" latinLnBrk="0" hangingPunct="1">
+              <a:lnSpc>
+                <a:spcPct val="110000"/>
+              </a:lnSpc>
+              <a:spcBef>
+                <a:spcPts val="500"/>
+              </a:spcBef>
+              <a:buFont typeface="Arial" panose="020B0604020202020204" pitchFamily="34" charset="0"/>
+              <a:buChar char="•"/>
+              <a:defRPr sz="1600" kern="1200">
+                <a:solidFill>
+                  <a:schemeClr val="tx1"/>
+                </a:solidFill>
+                <a:latin typeface="+mn-lt"/>
+                <a:ea typeface="+mn-ea"/>
+                <a:cs typeface="+mn-cs"/>
+              </a:defRPr>
+            </a:lvl4pPr>
+            <a:lvl5pPr marL="2057400" indent="-228600" algn="l" defTabSz="914400" rtl="0" eaLnBrk="1" latinLnBrk="0" hangingPunct="1">
+              <a:lnSpc>
+                <a:spcPct val="110000"/>
+              </a:lnSpc>
+              <a:spcBef>
+                <a:spcPts val="500"/>
+              </a:spcBef>
+              <a:buFont typeface="Arial" panose="020B0604020202020204" pitchFamily="34" charset="0"/>
+              <a:buChar char="•"/>
+              <a:defRPr sz="1600" kern="1200">
+                <a:solidFill>
+                  <a:schemeClr val="tx1"/>
+                </a:solidFill>
+                <a:latin typeface="+mn-lt"/>
+                <a:ea typeface="+mn-ea"/>
+                <a:cs typeface="+mn-cs"/>
+              </a:defRPr>
+            </a:lvl5pPr>
+            <a:lvl6pPr marL="2514600" indent="-228600" algn="l" defTabSz="914400" rtl="0" eaLnBrk="1" latinLnBrk="0" hangingPunct="1">
+              <a:lnSpc>
+                <a:spcPct val="90000"/>
+              </a:lnSpc>
+              <a:spcBef>
+                <a:spcPts val="500"/>
+              </a:spcBef>
+              <a:buFont typeface="Arial" panose="020B0604020202020204" pitchFamily="34" charset="0"/>
+              <a:buChar char="•"/>
+              <a:defRPr sz="1800" kern="1200">
+                <a:solidFill>
+                  <a:schemeClr val="tx1"/>
+                </a:solidFill>
+                <a:latin typeface="+mn-lt"/>
+                <a:ea typeface="+mn-ea"/>
+                <a:cs typeface="+mn-cs"/>
+              </a:defRPr>
+            </a:lvl6pPr>
+            <a:lvl7pPr marL="2971800" indent="-228600" algn="l" defTabSz="914400" rtl="0" eaLnBrk="1" latinLnBrk="0" hangingPunct="1">
+              <a:lnSpc>
+                <a:spcPct val="90000"/>
+              </a:lnSpc>
+              <a:spcBef>
+                <a:spcPts val="500"/>
+              </a:spcBef>
+              <a:buFont typeface="Arial" panose="020B0604020202020204" pitchFamily="34" charset="0"/>
+              <a:buChar char="•"/>
+              <a:defRPr sz="1800" kern="1200">
+                <a:solidFill>
+                  <a:schemeClr val="tx1"/>
+                </a:solidFill>
+                <a:latin typeface="+mn-lt"/>
+                <a:ea typeface="+mn-ea"/>
+                <a:cs typeface="+mn-cs"/>
+              </a:defRPr>
+            </a:lvl7pPr>
+            <a:lvl8pPr marL="3429000" indent="-228600" algn="l" defTabSz="914400" rtl="0" eaLnBrk="1" latinLnBrk="0" hangingPunct="1">
+              <a:lnSpc>
+                <a:spcPct val="90000"/>
+              </a:lnSpc>
+              <a:spcBef>
+                <a:spcPts val="500"/>
+              </a:spcBef>
+              <a:buFont typeface="Arial" panose="020B0604020202020204" pitchFamily="34" charset="0"/>
+              <a:buChar char="•"/>
+              <a:defRPr sz="1800" kern="1200">
+                <a:solidFill>
+                  <a:schemeClr val="tx1"/>
+                </a:solidFill>
+                <a:latin typeface="+mn-lt"/>
+                <a:ea typeface="+mn-ea"/>
+                <a:cs typeface="+mn-cs"/>
+              </a:defRPr>
+            </a:lvl8pPr>
+            <a:lvl9pPr marL="3886200" indent="-228600" algn="l" defTabSz="914400" rtl="0" eaLnBrk="1" latinLnBrk="0" hangingPunct="1">
+              <a:lnSpc>
+                <a:spcPct val="90000"/>
+              </a:lnSpc>
+              <a:spcBef>
+                <a:spcPts val="500"/>
+              </a:spcBef>
+              <a:buFont typeface="Arial" panose="020B0604020202020204" pitchFamily="34" charset="0"/>
+              <a:buChar char="•"/>
+              <a:defRPr sz="1800" kern="1200">
+                <a:solidFill>
+                  <a:schemeClr val="tx1"/>
+                </a:solidFill>
+                <a:latin typeface="+mn-lt"/>
+                <a:ea typeface="+mn-ea"/>
+                <a:cs typeface="+mn-cs"/>
+              </a:defRPr>
+            </a:lvl9pPr>
+          </a:lstStyle>
+          <a:p>
+            <a:pPr marL="0" indent="0" algn="ctr">
+              <a:buNone/>
+            </a:pPr>
+            <a:r>
+              <a:rPr lang="en-US" sz="3200" dirty="0"/>
+              <a:t>Test Vocabulary</a:t>
+            </a:r>
+          </a:p>
+        </p:txBody>
+      </p:sp>
+      <p:sp>
+        <p:nvSpPr>
+          <p:cNvPr id="19" name="Text Placeholder 2">
+            <a:extLst>
+              <a:ext uri="{FF2B5EF4-FFF2-40B4-BE49-F238E27FC236}">
+                <a16:creationId xmlns:a16="http://schemas.microsoft.com/office/drawing/2014/main" id="{E36B1662-CC85-4301-BC36-44DA5D4F9B52}"/>
+              </a:ext>
+            </a:extLst>
+          </p:cNvPr>
+          <p:cNvSpPr txBox="1">
+            <a:spLocks/>
+          </p:cNvSpPr>
+          <p:nvPr/>
+        </p:nvSpPr>
+        <p:spPr>
+          <a:xfrm>
+            <a:off x="6316717" y="2850519"/>
+            <a:ext cx="5157787" cy="823912"/>
+          </a:xfrm>
+          <a:prstGeom prst="rect">
+            <a:avLst/>
+          </a:prstGeom>
+        </p:spPr>
+        <p:txBody>
+          <a:bodyPr vert="horz" lIns="91440" tIns="45720" rIns="91440" bIns="45720" rtlCol="0">
+            <a:normAutofit/>
+          </a:bodyPr>
+          <a:lstStyle>
+            <a:lvl1pPr marL="228600" indent="-228600" algn="l" defTabSz="914400" rtl="0" eaLnBrk="1" latinLnBrk="0" hangingPunct="1">
+              <a:lnSpc>
+                <a:spcPct val="110000"/>
+              </a:lnSpc>
+              <a:spcBef>
+                <a:spcPts val="1000"/>
+              </a:spcBef>
+              <a:buFont typeface="Arial" panose="020B0604020202020204" pitchFamily="34" charset="0"/>
+              <a:buChar char="•"/>
+              <a:defRPr sz="2400" kern="1200">
+                <a:solidFill>
+                  <a:schemeClr val="tx1"/>
+                </a:solidFill>
+                <a:latin typeface="+mn-lt"/>
+                <a:ea typeface="+mn-ea"/>
+                <a:cs typeface="+mn-cs"/>
+              </a:defRPr>
+            </a:lvl1pPr>
+            <a:lvl2pPr marL="685800" indent="-228600" algn="l" defTabSz="914400" rtl="0" eaLnBrk="1" latinLnBrk="0" hangingPunct="1">
+              <a:lnSpc>
+                <a:spcPct val="110000"/>
+              </a:lnSpc>
+              <a:spcBef>
+                <a:spcPts val="500"/>
+              </a:spcBef>
+              <a:buFont typeface="Arial" panose="020B0604020202020204" pitchFamily="34" charset="0"/>
+              <a:buChar char="•"/>
+              <a:defRPr sz="2000" kern="1200">
+                <a:solidFill>
+                  <a:schemeClr val="tx1"/>
+                </a:solidFill>
+                <a:latin typeface="+mn-lt"/>
+                <a:ea typeface="+mn-ea"/>
+                <a:cs typeface="+mn-cs"/>
+              </a:defRPr>
+            </a:lvl2pPr>
+            <a:lvl3pPr marL="1143000" indent="-228600" algn="l" defTabSz="914400" rtl="0" eaLnBrk="1" latinLnBrk="0" hangingPunct="1">
+              <a:lnSpc>
+                <a:spcPct val="110000"/>
+              </a:lnSpc>
+              <a:spcBef>
+                <a:spcPts val="500"/>
+              </a:spcBef>
+              <a:buFont typeface="Arial" panose="020B0604020202020204" pitchFamily="34" charset="0"/>
+              <a:buChar char="•"/>
+              <a:defRPr sz="1800" kern="1200">
+                <a:solidFill>
+                  <a:schemeClr val="tx1"/>
+                </a:solidFill>
+                <a:latin typeface="+mn-lt"/>
+                <a:ea typeface="+mn-ea"/>
+                <a:cs typeface="+mn-cs"/>
+              </a:defRPr>
+            </a:lvl3pPr>
+            <a:lvl4pPr marL="1600200" indent="-228600" algn="l" defTabSz="914400" rtl="0" eaLnBrk="1" latinLnBrk="0" hangingPunct="1">
+              <a:lnSpc>
+                <a:spcPct val="110000"/>
+              </a:lnSpc>
+              <a:spcBef>
+                <a:spcPts val="500"/>
+              </a:spcBef>
+              <a:buFont typeface="Arial" panose="020B0604020202020204" pitchFamily="34" charset="0"/>
+              <a:buChar char="•"/>
+              <a:defRPr sz="1600" kern="1200">
+                <a:solidFill>
+                  <a:schemeClr val="tx1"/>
+                </a:solidFill>
+                <a:latin typeface="+mn-lt"/>
+                <a:ea typeface="+mn-ea"/>
+                <a:cs typeface="+mn-cs"/>
+              </a:defRPr>
+            </a:lvl4pPr>
+            <a:lvl5pPr marL="2057400" indent="-228600" algn="l" defTabSz="914400" rtl="0" eaLnBrk="1" latinLnBrk="0" hangingPunct="1">
+              <a:lnSpc>
+                <a:spcPct val="110000"/>
+              </a:lnSpc>
+              <a:spcBef>
+                <a:spcPts val="500"/>
+              </a:spcBef>
+              <a:buFont typeface="Arial" panose="020B0604020202020204" pitchFamily="34" charset="0"/>
+              <a:buChar char="•"/>
+              <a:defRPr sz="1600" kern="1200">
+                <a:solidFill>
+                  <a:schemeClr val="tx1"/>
+                </a:solidFill>
+                <a:latin typeface="+mn-lt"/>
+                <a:ea typeface="+mn-ea"/>
+                <a:cs typeface="+mn-cs"/>
+              </a:defRPr>
+            </a:lvl5pPr>
+            <a:lvl6pPr marL="2514600" indent="-228600" algn="l" defTabSz="914400" rtl="0" eaLnBrk="1" latinLnBrk="0" hangingPunct="1">
+              <a:lnSpc>
+                <a:spcPct val="90000"/>
+              </a:lnSpc>
+              <a:spcBef>
+                <a:spcPts val="500"/>
+              </a:spcBef>
+              <a:buFont typeface="Arial" panose="020B0604020202020204" pitchFamily="34" charset="0"/>
+              <a:buChar char="•"/>
+              <a:defRPr sz="1800" kern="1200">
+                <a:solidFill>
+                  <a:schemeClr val="tx1"/>
+                </a:solidFill>
+                <a:latin typeface="+mn-lt"/>
+                <a:ea typeface="+mn-ea"/>
+                <a:cs typeface="+mn-cs"/>
+              </a:defRPr>
+            </a:lvl6pPr>
+            <a:lvl7pPr marL="2971800" indent="-228600" algn="l" defTabSz="914400" rtl="0" eaLnBrk="1" latinLnBrk="0" hangingPunct="1">
+              <a:lnSpc>
+                <a:spcPct val="90000"/>
+              </a:lnSpc>
+              <a:spcBef>
+                <a:spcPts val="500"/>
+              </a:spcBef>
+              <a:buFont typeface="Arial" panose="020B0604020202020204" pitchFamily="34" charset="0"/>
+              <a:buChar char="•"/>
+              <a:defRPr sz="1800" kern="1200">
+                <a:solidFill>
+                  <a:schemeClr val="tx1"/>
+                </a:solidFill>
+                <a:latin typeface="+mn-lt"/>
+                <a:ea typeface="+mn-ea"/>
+                <a:cs typeface="+mn-cs"/>
+              </a:defRPr>
+            </a:lvl7pPr>
+            <a:lvl8pPr marL="3429000" indent="-228600" algn="l" defTabSz="914400" rtl="0" eaLnBrk="1" latinLnBrk="0" hangingPunct="1">
+              <a:lnSpc>
+                <a:spcPct val="90000"/>
+              </a:lnSpc>
+              <a:spcBef>
+                <a:spcPts val="500"/>
+              </a:spcBef>
+              <a:buFont typeface="Arial" panose="020B0604020202020204" pitchFamily="34" charset="0"/>
+              <a:buChar char="•"/>
+              <a:defRPr sz="1800" kern="1200">
+                <a:solidFill>
+                  <a:schemeClr val="tx1"/>
+                </a:solidFill>
+                <a:latin typeface="+mn-lt"/>
+                <a:ea typeface="+mn-ea"/>
+                <a:cs typeface="+mn-cs"/>
+              </a:defRPr>
+            </a:lvl8pPr>
+            <a:lvl9pPr marL="3886200" indent="-228600" algn="l" defTabSz="914400" rtl="0" eaLnBrk="1" latinLnBrk="0" hangingPunct="1">
+              <a:lnSpc>
+                <a:spcPct val="90000"/>
+              </a:lnSpc>
+              <a:spcBef>
+                <a:spcPts val="500"/>
+              </a:spcBef>
+              <a:buFont typeface="Arial" panose="020B0604020202020204" pitchFamily="34" charset="0"/>
+              <a:buChar char="•"/>
+              <a:defRPr sz="1800" kern="1200">
+                <a:solidFill>
+                  <a:schemeClr val="tx1"/>
+                </a:solidFill>
+                <a:latin typeface="+mn-lt"/>
+                <a:ea typeface="+mn-ea"/>
+                <a:cs typeface="+mn-cs"/>
+              </a:defRPr>
+            </a:lvl9pPr>
+          </a:lstStyle>
+          <a:p>
+            <a:pPr marL="0" indent="0" algn="ctr">
+              <a:buNone/>
+            </a:pPr>
+            <a:r>
+              <a:rPr lang="en-US" sz="3200" dirty="0"/>
+              <a:t>Test Smells</a:t>
             </a:r>
           </a:p>
         </p:txBody>
       </p:sp>
       <p:pic>
         <p:nvPicPr>
-          <p:cNvPr id="2050" name="Picture 2" descr="Python pioneer assesses the 30-year-old programming language | VentureBeat">
+          <p:cNvPr id="1026" name="Picture 2" descr="Improve your English grammar and vocabulary | LearnEnglish Teens - British  Council">
             <a:extLst>
               <a:ext uri="{FF2B5EF4-FFF2-40B4-BE49-F238E27FC236}">
-                <a16:creationId xmlns:a16="http://schemas.microsoft.com/office/drawing/2014/main" id="{13174542-4889-48FB-ADAF-41D14DCB5B62}"/>
+                <a16:creationId xmlns:a16="http://schemas.microsoft.com/office/drawing/2014/main" id="{74EC1326-9025-406B-AD8B-04F0C0D3CBF4}"/>
               </a:ext>
             </a:extLst>
           </p:cNvPr>
@@ -23589,8 +24617,8 @@
         </p:blipFill>
         <p:spPr bwMode="auto">
           <a:xfrm>
-            <a:off x="7318329" y="2027435"/>
-            <a:ext cx="2771775" cy="1647825"/>
+            <a:off x="1626503" y="4048217"/>
+            <a:ext cx="3134557" cy="1880734"/>
           </a:xfrm>
           <a:prstGeom prst="rect">
             <a:avLst/>
@@ -23609,10 +24637,10 @@
       </p:pic>
       <p:pic>
         <p:nvPicPr>
-          <p:cNvPr id="2052" name="Picture 4" descr="Use Case vs Test Case | Quick Guide to the Top Differences">
+          <p:cNvPr id="1028" name="Picture 4" descr="Bad Business Practice: 5 Things Entrepreneurs Do Wrong | SmallBizClub">
             <a:extLst>
               <a:ext uri="{FF2B5EF4-FFF2-40B4-BE49-F238E27FC236}">
-                <a16:creationId xmlns:a16="http://schemas.microsoft.com/office/drawing/2014/main" id="{6DEB8726-41EB-4F7B-88CB-EEB225DBA572}"/>
+                <a16:creationId xmlns:a16="http://schemas.microsoft.com/office/drawing/2014/main" id="{08F98F75-3DBE-4DA0-B291-9154B40B4C20}"/>
               </a:ext>
             </a:extLst>
           </p:cNvPr>
@@ -23621,7 +24649,7 @@
           </p:cNvPicPr>
           <p:nvPr/>
         </p:nvPicPr>
-        <p:blipFill rotWithShape="1">
+        <p:blipFill>
           <a:blip r:embed="rId3">
             <a:extLst>
               <a:ext uri="{28A0092B-C50C-407E-A947-70E740481C1C}">
@@ -23629,13 +24657,15 @@
               </a:ext>
             </a:extLst>
           </a:blip>
-          <a:srcRect l="56560" t="8354" r="3589" b="12094"/>
-          <a:stretch/>
+          <a:srcRect/>
+          <a:stretch>
+            <a:fillRect/>
+          </a:stretch>
         </p:blipFill>
         <p:spPr bwMode="auto">
           <a:xfrm>
-            <a:off x="7869215" y="4006652"/>
-            <a:ext cx="1670004" cy="1654445"/>
+            <a:off x="7225726" y="3978762"/>
+            <a:ext cx="3588983" cy="2019643"/>
           </a:xfrm>
           <a:prstGeom prst="rect">
             <a:avLst/>
@@ -23655,7 +24685,7 @@
     </p:spTree>
     <p:extLst>
       <p:ext uri="{BB962C8B-B14F-4D97-AF65-F5344CB8AC3E}">
-        <p14:creationId xmlns:p14="http://schemas.microsoft.com/office/powerpoint/2010/main" val="4038912907"/>
+        <p14:creationId xmlns:p14="http://schemas.microsoft.com/office/powerpoint/2010/main" val="2984345382"/>
       </p:ext>
     </p:extLst>
   </p:cSld>
@@ -23696,11 +24726,7 @@
                                           </p:stCondLst>
                                         </p:cTn>
                                         <p:tgtEl>
-                                          <p:spTgt spid="4">
-                                            <p:txEl>
-                                              <p:pRg st="0" end="0"/>
-                                            </p:txEl>
-                                          </p:spTgt>
+                                          <p:spTgt spid="15"/>
                                         </p:tgtEl>
                                         <p:attrNameLst>
                                           <p:attrName>style.visibility</p:attrName>
@@ -23714,11 +24740,7 @@
                                       <p:cBhvr>
                                         <p:cTn id="7" dur="500"/>
                                         <p:tgtEl>
-                                          <p:spTgt spid="4">
-                                            <p:txEl>
-                                              <p:pRg st="0" end="0"/>
-                                            </p:txEl>
-                                          </p:spTgt>
+                                          <p:spTgt spid="15"/>
                                         </p:tgtEl>
                                       </p:cBhvr>
                                     </p:animEffect>
@@ -23726,7 +24748,7 @@
                                 </p:cTn>
                               </p:par>
                               <p:par>
-                                <p:cTn id="8" presetID="10" presetClass="entr" presetSubtype="0" fill="hold" nodeType="withEffect">
+                                <p:cTn id="8" presetID="10" presetClass="entr" presetSubtype="0" fill="hold" grpId="0" nodeType="withEffect">
                                   <p:stCondLst>
                                     <p:cond delay="0"/>
                                   </p:stCondLst>
@@ -23739,7 +24761,7 @@
                                           </p:stCondLst>
                                         </p:cTn>
                                         <p:tgtEl>
-                                          <p:spTgt spid="2050"/>
+                                          <p:spTgt spid="17"/>
                                         </p:tgtEl>
                                         <p:attrNameLst>
                                           <p:attrName>style.visibility</p:attrName>
@@ -23753,7 +24775,42 @@
                                       <p:cBhvr>
                                         <p:cTn id="10" dur="500"/>
                                         <p:tgtEl>
-                                          <p:spTgt spid="2050"/>
+                                          <p:spTgt spid="17"/>
+                                        </p:tgtEl>
+                                      </p:cBhvr>
+                                    </p:animEffect>
+                                  </p:childTnLst>
+                                </p:cTn>
+                              </p:par>
+                              <p:par>
+                                <p:cTn id="11" presetID="10" presetClass="entr" presetSubtype="0" fill="hold" nodeType="withEffect">
+                                  <p:stCondLst>
+                                    <p:cond delay="0"/>
+                                  </p:stCondLst>
+                                  <p:childTnLst>
+                                    <p:set>
+                                      <p:cBhvr>
+                                        <p:cTn id="12" dur="1" fill="hold">
+                                          <p:stCondLst>
+                                            <p:cond delay="0"/>
+                                          </p:stCondLst>
+                                        </p:cTn>
+                                        <p:tgtEl>
+                                          <p:spTgt spid="1026"/>
+                                        </p:tgtEl>
+                                        <p:attrNameLst>
+                                          <p:attrName>style.visibility</p:attrName>
+                                        </p:attrNameLst>
+                                      </p:cBhvr>
+                                      <p:to>
+                                        <p:strVal val="visible"/>
+                                      </p:to>
+                                    </p:set>
+                                    <p:animEffect transition="in" filter="fade">
+                                      <p:cBhvr>
+                                        <p:cTn id="13" dur="500"/>
+                                        <p:tgtEl>
+                                          <p:spTgt spid="1026"/>
                                         </p:tgtEl>
                                       </p:cBhvr>
                                     </p:animEffect>
@@ -23767,36 +24824,32 @@
                     </p:cTn>
                   </p:par>
                   <p:par>
-                    <p:cTn id="11" fill="hold">
+                    <p:cTn id="14" fill="hold">
                       <p:stCondLst>
                         <p:cond delay="indefinite"/>
                       </p:stCondLst>
                       <p:childTnLst>
                         <p:par>
-                          <p:cTn id="12" fill="hold">
+                          <p:cTn id="15" fill="hold">
                             <p:stCondLst>
                               <p:cond delay="0"/>
                             </p:stCondLst>
                             <p:childTnLst>
                               <p:par>
-                                <p:cTn id="13" presetID="10" presetClass="entr" presetSubtype="0" fill="hold" grpId="0" nodeType="clickEffect">
+                                <p:cTn id="16" presetID="10" presetClass="entr" presetSubtype="0" fill="hold" grpId="0" nodeType="clickEffect">
                                   <p:stCondLst>
                                     <p:cond delay="0"/>
                                   </p:stCondLst>
                                   <p:childTnLst>
                                     <p:set>
                                       <p:cBhvr>
-                                        <p:cTn id="14" dur="1" fill="hold">
+                                        <p:cTn id="17" dur="1" fill="hold">
                                           <p:stCondLst>
                                             <p:cond delay="0"/>
                                           </p:stCondLst>
                                         </p:cTn>
                                         <p:tgtEl>
-                                          <p:spTgt spid="4">
-                                            <p:txEl>
-                                              <p:pRg st="2" end="2"/>
-                                            </p:txEl>
-                                          </p:spTgt>
+                                          <p:spTgt spid="16"/>
                                         </p:tgtEl>
                                         <p:attrNameLst>
                                           <p:attrName>style.visibility</p:attrName>
@@ -23808,56 +24861,30 @@
                                     </p:set>
                                     <p:animEffect transition="in" filter="fade">
                                       <p:cBhvr>
-                                        <p:cTn id="15" dur="500"/>
+                                        <p:cTn id="18" dur="500"/>
                                         <p:tgtEl>
-                                          <p:spTgt spid="4">
-                                            <p:txEl>
-                                              <p:pRg st="2" end="2"/>
-                                            </p:txEl>
-                                          </p:spTgt>
+                                          <p:spTgt spid="16"/>
                                         </p:tgtEl>
                                       </p:cBhvr>
                                     </p:animEffect>
                                   </p:childTnLst>
                                 </p:cTn>
                               </p:par>
-                            </p:childTnLst>
-                          </p:cTn>
-                        </p:par>
-                      </p:childTnLst>
-                    </p:cTn>
-                  </p:par>
-                  <p:par>
-                    <p:cTn id="16" fill="hold">
-                      <p:stCondLst>
-                        <p:cond delay="indefinite"/>
-                      </p:stCondLst>
-                      <p:childTnLst>
-                        <p:par>
-                          <p:cTn id="17" fill="hold">
-                            <p:stCondLst>
-                              <p:cond delay="0"/>
-                            </p:stCondLst>
-                            <p:childTnLst>
                               <p:par>
-                                <p:cTn id="18" presetID="10" presetClass="entr" presetSubtype="0" fill="hold" grpId="0" nodeType="clickEffect">
+                                <p:cTn id="19" presetID="10" presetClass="entr" presetSubtype="0" fill="hold" grpId="0" nodeType="withEffect">
                                   <p:stCondLst>
                                     <p:cond delay="0"/>
                                   </p:stCondLst>
                                   <p:childTnLst>
                                     <p:set>
                                       <p:cBhvr>
-                                        <p:cTn id="19" dur="1" fill="hold">
+                                        <p:cTn id="20" dur="1" fill="hold">
                                           <p:stCondLst>
                                             <p:cond delay="0"/>
                                           </p:stCondLst>
                                         </p:cTn>
                                         <p:tgtEl>
-                                          <p:spTgt spid="4">
-                                            <p:txEl>
-                                              <p:pRg st="4" end="4"/>
-                                            </p:txEl>
-                                          </p:spTgt>
+                                          <p:spTgt spid="19"/>
                                         </p:tgtEl>
                                         <p:attrNameLst>
                                           <p:attrName>style.visibility</p:attrName>
@@ -23869,13 +24896,9 @@
                                     </p:set>
                                     <p:animEffect transition="in" filter="fade">
                                       <p:cBhvr>
-                                        <p:cTn id="20" dur="500"/>
+                                        <p:cTn id="21" dur="500"/>
                                         <p:tgtEl>
-                                          <p:spTgt spid="4">
-                                            <p:txEl>
-                                              <p:pRg st="4" end="4"/>
-                                            </p:txEl>
-                                          </p:spTgt>
+                                          <p:spTgt spid="19"/>
                                         </p:tgtEl>
                                       </p:cBhvr>
                                     </p:animEffect>
@@ -23883,20 +24906,20 @@
                                 </p:cTn>
                               </p:par>
                               <p:par>
-                                <p:cTn id="21" presetID="10" presetClass="entr" presetSubtype="0" fill="hold" nodeType="withEffect">
+                                <p:cTn id="22" presetID="10" presetClass="entr" presetSubtype="0" fill="hold" nodeType="withEffect">
                                   <p:stCondLst>
                                     <p:cond delay="0"/>
                                   </p:stCondLst>
                                   <p:childTnLst>
                                     <p:set>
                                       <p:cBhvr>
-                                        <p:cTn id="22" dur="1" fill="hold">
+                                        <p:cTn id="23" dur="1" fill="hold">
                                           <p:stCondLst>
                                             <p:cond delay="0"/>
                                           </p:stCondLst>
                                         </p:cTn>
                                         <p:tgtEl>
-                                          <p:spTgt spid="2052"/>
+                                          <p:spTgt spid="1028"/>
                                         </p:tgtEl>
                                         <p:attrNameLst>
                                           <p:attrName>style.visibility</p:attrName>
@@ -23908,9 +24931,9 @@
                                     </p:set>
                                     <p:animEffect transition="in" filter="fade">
                                       <p:cBhvr>
-                                        <p:cTn id="23" dur="500"/>
+                                        <p:cTn id="24" dur="500"/>
                                         <p:tgtEl>
-                                          <p:spTgt spid="2052"/>
+                                          <p:spTgt spid="1028"/>
                                         </p:tgtEl>
                                       </p:cBhvr>
                                     </p:animEffect>
@@ -23945,7 +24968,10 @@
       </p:par>
     </p:tnLst>
     <p:bldLst>
-      <p:bldP spid="4" grpId="0" uiExpand="1" build="p"/>
+      <p:bldP spid="15" grpId="0" animBg="1"/>
+      <p:bldP spid="16" grpId="0" animBg="1"/>
+      <p:bldP spid="17" grpId="0"/>
+      <p:bldP spid="19" grpId="0"/>
     </p:bldLst>
   </p:timing>
 </p:sld>
@@ -25361,21 +26387,15 @@
             </a:r>
           </a:p>
           <a:p>
+            <a:pPr marL="0" indent="0">
+              <a:buNone/>
+            </a:pPr>
             <a:endParaRPr lang="en-US" dirty="0"/>
           </a:p>
           <a:p>
             <a:r>
               <a:rPr lang="en-US" dirty="0"/>
-              <a:t>~22,000 Repositories</a:t>
-            </a:r>
-          </a:p>
-          <a:p>
-            <a:endParaRPr lang="en-US" dirty="0"/>
-          </a:p>
-          <a:p>
-            <a:r>
-              <a:rPr lang="en-US" dirty="0"/>
-              <a:t>~800,000 Test Cases</a:t>
+              <a:t>5719 Test Cases</a:t>
             </a:r>
           </a:p>
           <a:p>
@@ -25674,76 +26694,15 @@
                                   </p:childTnLst>
                                 </p:cTn>
                               </p:par>
-                            </p:childTnLst>
-                          </p:cTn>
-                        </p:par>
-                      </p:childTnLst>
-                    </p:cTn>
-                  </p:par>
-                  <p:par>
-                    <p:cTn id="16" fill="hold">
-                      <p:stCondLst>
-                        <p:cond delay="indefinite"/>
-                      </p:stCondLst>
-                      <p:childTnLst>
-                        <p:par>
-                          <p:cTn id="17" fill="hold">
-                            <p:stCondLst>
-                              <p:cond delay="0"/>
-                            </p:stCondLst>
-                            <p:childTnLst>
                               <p:par>
-                                <p:cTn id="18" presetID="10" presetClass="entr" presetSubtype="0" fill="hold" grpId="0" nodeType="clickEffect">
+                                <p:cTn id="16" presetID="10" presetClass="entr" presetSubtype="0" fill="hold" nodeType="withEffect">
                                   <p:stCondLst>
                                     <p:cond delay="0"/>
                                   </p:stCondLst>
                                   <p:childTnLst>
                                     <p:set>
                                       <p:cBhvr>
-                                        <p:cTn id="19" dur="1" fill="hold">
-                                          <p:stCondLst>
-                                            <p:cond delay="0"/>
-                                          </p:stCondLst>
-                                        </p:cTn>
-                                        <p:tgtEl>
-                                          <p:spTgt spid="4">
-                                            <p:txEl>
-                                              <p:pRg st="4" end="4"/>
-                                            </p:txEl>
-                                          </p:spTgt>
-                                        </p:tgtEl>
-                                        <p:attrNameLst>
-                                          <p:attrName>style.visibility</p:attrName>
-                                        </p:attrNameLst>
-                                      </p:cBhvr>
-                                      <p:to>
-                                        <p:strVal val="visible"/>
-                                      </p:to>
-                                    </p:set>
-                                    <p:animEffect transition="in" filter="fade">
-                                      <p:cBhvr>
-                                        <p:cTn id="20" dur="500"/>
-                                        <p:tgtEl>
-                                          <p:spTgt spid="4">
-                                            <p:txEl>
-                                              <p:pRg st="4" end="4"/>
-                                            </p:txEl>
-                                          </p:spTgt>
-                                        </p:tgtEl>
-                                      </p:cBhvr>
-                                    </p:animEffect>
-                                  </p:childTnLst>
-                                </p:cTn>
-                              </p:par>
-                              <p:par>
-                                <p:cTn id="21" presetID="10" presetClass="entr" presetSubtype="0" fill="hold" nodeType="withEffect">
-                                  <p:stCondLst>
-                                    <p:cond delay="0"/>
-                                  </p:stCondLst>
-                                  <p:childTnLst>
-                                    <p:set>
-                                      <p:cBhvr>
-                                        <p:cTn id="22" dur="1" fill="hold">
+                                        <p:cTn id="17" dur="1" fill="hold">
                                           <p:stCondLst>
                                             <p:cond delay="0"/>
                                           </p:stCondLst>
@@ -25761,7 +26720,7 @@
                                     </p:set>
                                     <p:animEffect transition="in" filter="fade">
                                       <p:cBhvr>
-                                        <p:cTn id="23" dur="500"/>
+                                        <p:cTn id="18" dur="500"/>
                                         <p:tgtEl>
                                           <p:spTgt spid="2052"/>
                                         </p:tgtEl>
@@ -25955,7 +26914,7 @@
           <p:nvPr/>
         </p:nvPicPr>
         <p:blipFill>
-          <a:blip r:embed="rId2">
+          <a:blip r:embed="rId3">
             <a:extLst>
               <a:ext uri="{28A0092B-C50C-407E-A947-70E740481C1C}">
                 <a14:useLocalDpi xmlns:a14="http://schemas.microsoft.com/office/drawing/2010/main" val="0"/>
@@ -26002,7 +26961,7 @@
           <p:nvPr/>
         </p:nvPicPr>
         <p:blipFill rotWithShape="1">
-          <a:blip r:embed="rId3"/>
+          <a:blip r:embed="rId4"/>
           <a:srcRect b="51830"/>
           <a:stretch/>
         </p:blipFill>
@@ -27085,12 +28044,12 @@
             <p:nvPr/>
           </p:nvPicPr>
           <p:blipFill rotWithShape="1">
-            <a:blip r:embed="rId2">
+            <a:blip r:embed="rId3">
               <a:grayscl/>
               <a:extLst>
                 <a:ext uri="{BEBA8EAE-BF5A-486C-A8C5-ECC9F3942E4B}">
                   <a14:imgProps xmlns:a14="http://schemas.microsoft.com/office/drawing/2010/main">
-                    <a14:imgLayer r:embed="rId3">
+                    <a14:imgLayer r:embed="rId4">
                       <a14:imgEffect>
                         <a14:backgroundRemoval t="32198" b="67973" l="32630" r="67083">
                           <a14:foregroundMark x1="40787" y1="32709" x2="40787" y2="32709"/>
@@ -27487,7 +28446,7 @@
             <p:nvPr/>
           </p:nvPicPr>
           <p:blipFill>
-            <a:blip r:embed="rId4">
+            <a:blip r:embed="rId5">
               <a:extLst>
                 <a:ext uri="{28A0092B-C50C-407E-A947-70E740481C1C}">
                   <a14:useLocalDpi xmlns:a14="http://schemas.microsoft.com/office/drawing/2010/main" val="0"/>
@@ -27968,11 +28927,11 @@
           <p:nvPr/>
         </p:nvPicPr>
         <p:blipFill rotWithShape="1">
-          <a:blip r:embed="rId5">
+          <a:blip r:embed="rId6">
             <a:extLst>
               <a:ext uri="{BEBA8EAE-BF5A-486C-A8C5-ECC9F3942E4B}">
                 <a14:imgProps xmlns:a14="http://schemas.microsoft.com/office/drawing/2010/main">
-                  <a14:imgLayer r:embed="rId6">
+                  <a14:imgLayer r:embed="rId7">
                     <a14:imgEffect>
                       <a14:backgroundRemoval t="20625" b="78750" l="19500" r="77625">
                         <a14:foregroundMark x1="36750" y1="52750" x2="36750" y2="52750"/>
@@ -28028,18 +28987,18 @@
           <p:nvPr/>
         </p:nvPicPr>
         <p:blipFill>
-          <a:blip r:embed="rId7">
+          <a:blip r:embed="rId8">
             <a:duotone>
               <a:prstClr val="black"/>
-              <a:schemeClr val="tx2">
+              <a:srgbClr val="412524">
                 <a:tint val="45000"/>
                 <a:satMod val="400000"/>
-              </a:schemeClr>
+              </a:srgbClr>
             </a:duotone>
             <a:extLst>
               <a:ext uri="{BEBA8EAE-BF5A-486C-A8C5-ECC9F3942E4B}">
                 <a14:imgProps xmlns:a14="http://schemas.microsoft.com/office/drawing/2010/main">
-                  <a14:imgLayer r:embed="rId8">
+                  <a14:imgLayer r:embed="rId9">
                     <a14:imgEffect>
                       <a14:backgroundRemoval t="2445" b="89872" l="10000" r="90000">
                         <a14:foregroundMark x1="36905" y1="21304" x2="36905" y2="21304"/>
@@ -30045,13 +31004,13 @@
   <p:clrMapOvr>
     <a:masterClrMapping/>
   </p:clrMapOvr>
-  <mc:AlternateContent xmlns:mc="http://schemas.openxmlformats.org/markup-compatibility/2006">
-    <mc:Choice xmlns:p14="http://schemas.microsoft.com/office/powerpoint/2010/main" Requires="p14">
+  <mc:AlternateContent xmlns:mc="http://schemas.openxmlformats.org/markup-compatibility/2006" xmlns:p14="http://schemas.microsoft.com/office/powerpoint/2010/main">
+    <mc:Choice Requires="p14">
       <p:transition spd="med" p14:dur="700">
         <p:fade/>
       </p:transition>
     </mc:Choice>
-    <mc:Fallback>
+    <mc:Fallback xmlns="">
       <p:transition spd="med">
         <p:fade/>
       </p:transition>
@@ -32011,13 +32970,13 @@
   <p:clrMapOvr>
     <a:masterClrMapping/>
   </p:clrMapOvr>
-  <mc:AlternateContent xmlns:mc="http://schemas.openxmlformats.org/markup-compatibility/2006">
-    <mc:Choice xmlns:p159="http://schemas.microsoft.com/office/powerpoint/2015/09/main" Requires="p159">
+  <mc:AlternateContent xmlns:mc="http://schemas.openxmlformats.org/markup-compatibility/2006" xmlns:p159="http://schemas.microsoft.com/office/powerpoint/2015/09/main">
+    <mc:Choice Requires="p159">
       <p:transition spd="slow">
         <p159:morph option="byObject"/>
       </p:transition>
     </mc:Choice>
-    <mc:Fallback>
+    <mc:Fallback xmlns="">
       <p:transition spd="slow">
         <p:fade/>
       </p:transition>

</xml_diff>